<commit_message>
Refactored some physics stuff and the debug sphere
</commit_message>
<xml_diff>
--- a/6044_FramPat/D2D/W02/C++ Interface class.pptx
+++ b/6044_FramPat/D2D/W02/C++ Interface class.pptx
@@ -262,7 +262,7 @@
           <a:p>
             <a:fld id="{6C71860C-01FE-4F98-8734-54F4F59C8235}" type="datetimeFigureOut">
               <a:rPr lang="en-CA" smtClean="0"/>
-              <a:t>2023-09-29</a:t>
+              <a:t>2023-10-02</a:t>
             </a:fld>
             <a:endParaRPr lang="en-CA"/>
           </a:p>
@@ -462,7 +462,7 @@
           <a:p>
             <a:fld id="{6C71860C-01FE-4F98-8734-54F4F59C8235}" type="datetimeFigureOut">
               <a:rPr lang="en-CA" smtClean="0"/>
-              <a:t>2023-09-29</a:t>
+              <a:t>2023-10-02</a:t>
             </a:fld>
             <a:endParaRPr lang="en-CA"/>
           </a:p>
@@ -672,7 +672,7 @@
           <a:p>
             <a:fld id="{6C71860C-01FE-4F98-8734-54F4F59C8235}" type="datetimeFigureOut">
               <a:rPr lang="en-CA" smtClean="0"/>
-              <a:t>2023-09-29</a:t>
+              <a:t>2023-10-02</a:t>
             </a:fld>
             <a:endParaRPr lang="en-CA"/>
           </a:p>
@@ -872,7 +872,7 @@
           <a:p>
             <a:fld id="{6C71860C-01FE-4F98-8734-54F4F59C8235}" type="datetimeFigureOut">
               <a:rPr lang="en-CA" smtClean="0"/>
-              <a:t>2023-09-29</a:t>
+              <a:t>2023-10-02</a:t>
             </a:fld>
             <a:endParaRPr lang="en-CA"/>
           </a:p>
@@ -1148,7 +1148,7 @@
           <a:p>
             <a:fld id="{6C71860C-01FE-4F98-8734-54F4F59C8235}" type="datetimeFigureOut">
               <a:rPr lang="en-CA" smtClean="0"/>
-              <a:t>2023-09-29</a:t>
+              <a:t>2023-10-02</a:t>
             </a:fld>
             <a:endParaRPr lang="en-CA"/>
           </a:p>
@@ -1416,7 +1416,7 @@
           <a:p>
             <a:fld id="{6C71860C-01FE-4F98-8734-54F4F59C8235}" type="datetimeFigureOut">
               <a:rPr lang="en-CA" smtClean="0"/>
-              <a:t>2023-09-29</a:t>
+              <a:t>2023-10-02</a:t>
             </a:fld>
             <a:endParaRPr lang="en-CA"/>
           </a:p>
@@ -1831,7 +1831,7 @@
           <a:p>
             <a:fld id="{6C71860C-01FE-4F98-8734-54F4F59C8235}" type="datetimeFigureOut">
               <a:rPr lang="en-CA" smtClean="0"/>
-              <a:t>2023-09-29</a:t>
+              <a:t>2023-10-02</a:t>
             </a:fld>
             <a:endParaRPr lang="en-CA"/>
           </a:p>
@@ -1973,7 +1973,7 @@
           <a:p>
             <a:fld id="{6C71860C-01FE-4F98-8734-54F4F59C8235}" type="datetimeFigureOut">
               <a:rPr lang="en-CA" smtClean="0"/>
-              <a:t>2023-09-29</a:t>
+              <a:t>2023-10-02</a:t>
             </a:fld>
             <a:endParaRPr lang="en-CA"/>
           </a:p>
@@ -2086,7 +2086,7 @@
           <a:p>
             <a:fld id="{6C71860C-01FE-4F98-8734-54F4F59C8235}" type="datetimeFigureOut">
               <a:rPr lang="en-CA" smtClean="0"/>
-              <a:t>2023-09-29</a:t>
+              <a:t>2023-10-02</a:t>
             </a:fld>
             <a:endParaRPr lang="en-CA"/>
           </a:p>
@@ -2399,7 +2399,7 @@
           <a:p>
             <a:fld id="{6C71860C-01FE-4F98-8734-54F4F59C8235}" type="datetimeFigureOut">
               <a:rPr lang="en-CA" smtClean="0"/>
-              <a:t>2023-09-29</a:t>
+              <a:t>2023-10-02</a:t>
             </a:fld>
             <a:endParaRPr lang="en-CA"/>
           </a:p>
@@ -2688,7 +2688,7 @@
           <a:p>
             <a:fld id="{6C71860C-01FE-4F98-8734-54F4F59C8235}" type="datetimeFigureOut">
               <a:rPr lang="en-CA" smtClean="0"/>
-              <a:t>2023-09-29</a:t>
+              <a:t>2023-10-02</a:t>
             </a:fld>
             <a:endParaRPr lang="en-CA"/>
           </a:p>
@@ -2931,7 +2931,7 @@
           <a:p>
             <a:fld id="{6C71860C-01FE-4F98-8734-54F4F59C8235}" type="datetimeFigureOut">
               <a:rPr lang="en-CA" smtClean="0"/>
-              <a:t>2023-09-29</a:t>
+              <a:t>2023-10-02</a:t>
             </a:fld>
             <a:endParaRPr lang="en-CA"/>
           </a:p>
@@ -3508,7 +3508,7 @@
           <a:p>
             <a:r>
               <a:rPr lang="en-CA" dirty="0"/>
-              <a:t>Make ONLY methods</a:t>
+              <a:t>Make ONLY methods  - NO DATA</a:t>
             </a:r>
           </a:p>
           <a:p>

</xml_diff>